<commit_message>
parameters to colors functional with doc
</commit_message>
<xml_diff>
--- a/09_param_rot_scale_view/media/animation_param.pptx
+++ b/09_param_rot_scale_view/media/animation_param.pptx
@@ -3028,7 +3028,7 @@
                   <a:schemeClr val="tx1"/>
                 </a:solidFill>
               </a:rPr>
-              <a:t>active view</a:t>
+              <a:t>active state</a:t>
             </a:r>
           </a:p>
         </p:txBody>
@@ -3177,80 +3177,6 @@
           </a:fontRef>
         </p:style>
       </p:cxnSp>
-      <p:pic>
-        <p:nvPicPr>
-          <p:cNvPr id="3" name="Picture 2">
-            <a:extLst>
-              <a:ext uri="{FF2B5EF4-FFF2-40B4-BE49-F238E27FC236}">
-                <a16:creationId xmlns:a16="http://schemas.microsoft.com/office/drawing/2014/main" id="{8EE0080D-A0BE-4354-9439-8C28C96DCD0E}"/>
-              </a:ext>
-            </a:extLst>
-          </p:cNvPr>
-          <p:cNvPicPr>
-            <a:picLocks noChangeAspect="1"/>
-          </p:cNvPicPr>
-          <p:nvPr/>
-        </p:nvPicPr>
-        <p:blipFill>
-          <a:blip r:embed="rId3"/>
-          <a:stretch>
-            <a:fillRect/>
-          </a:stretch>
-        </p:blipFill>
-        <p:spPr>
-          <a:xfrm>
-            <a:off x="1723373" y="3318951"/>
-            <a:ext cx="8906662" cy="1294801"/>
-          </a:xfrm>
-          <a:prstGeom prst="rect">
-            <a:avLst/>
-          </a:prstGeom>
-        </p:spPr>
-      </p:pic>
-      <p:cxnSp>
-        <p:nvCxnSpPr>
-          <p:cNvPr id="34" name="Straight Arrow Connector 33">
-            <a:extLst>
-              <a:ext uri="{FF2B5EF4-FFF2-40B4-BE49-F238E27FC236}">
-                <a16:creationId xmlns:a16="http://schemas.microsoft.com/office/drawing/2014/main" id="{4153D2F5-A3DB-44A2-B7C6-852D36DBC4B9}"/>
-              </a:ext>
-            </a:extLst>
-          </p:cNvPr>
-          <p:cNvCxnSpPr>
-            <a:cxnSpLocks/>
-          </p:cNvCxnSpPr>
-          <p:nvPr/>
-        </p:nvCxnSpPr>
-        <p:spPr>
-          <a:xfrm flipH="1">
-            <a:off x="6425852" y="1348496"/>
-            <a:ext cx="406645" cy="2872775"/>
-          </a:xfrm>
-          <a:prstGeom prst="straightConnector1">
-            <a:avLst/>
-          </a:prstGeom>
-          <a:ln w="50800">
-            <a:solidFill>
-              <a:srgbClr val="109677"/>
-            </a:solidFill>
-            <a:tailEnd type="arrow"/>
-          </a:ln>
-        </p:spPr>
-        <p:style>
-          <a:lnRef idx="1">
-            <a:schemeClr val="accent6"/>
-          </a:lnRef>
-          <a:fillRef idx="0">
-            <a:schemeClr val="accent6"/>
-          </a:fillRef>
-          <a:effectRef idx="0">
-            <a:schemeClr val="accent6"/>
-          </a:effectRef>
-          <a:fontRef idx="minor">
-            <a:schemeClr val="tx1"/>
-          </a:fontRef>
-        </p:style>
-      </p:cxnSp>
       <p:sp>
         <p:nvSpPr>
           <p:cNvPr id="14" name="Oval 13">
@@ -3305,7 +3231,7 @@
                   <a:schemeClr val="tx1"/>
                 </a:solidFill>
               </a:rPr>
-              <a:t>child 1 = view 1</a:t>
+              <a:t>child 1 = state 1</a:t>
             </a:r>
           </a:p>
         </p:txBody>
@@ -3364,7 +3290,7 @@
                   <a:schemeClr val="tx1"/>
                 </a:solidFill>
               </a:rPr>
-              <a:t>child 2 = view 2</a:t>
+              <a:t>child 2 = state 2</a:t>
             </a:r>
           </a:p>
         </p:txBody>
@@ -3431,6 +3357,80 @@
           <a:xfrm flipH="1" flipV="1">
             <a:off x="2789119" y="1995813"/>
             <a:ext cx="2033455" cy="335446"/>
+          </a:xfrm>
+          <a:prstGeom prst="straightConnector1">
+            <a:avLst/>
+          </a:prstGeom>
+          <a:ln w="50800">
+            <a:solidFill>
+              <a:srgbClr val="109677"/>
+            </a:solidFill>
+            <a:tailEnd type="arrow"/>
+          </a:ln>
+        </p:spPr>
+        <p:style>
+          <a:lnRef idx="1">
+            <a:schemeClr val="accent6"/>
+          </a:lnRef>
+          <a:fillRef idx="0">
+            <a:schemeClr val="accent6"/>
+          </a:fillRef>
+          <a:effectRef idx="0">
+            <a:schemeClr val="accent6"/>
+          </a:effectRef>
+          <a:fontRef idx="minor">
+            <a:schemeClr val="tx1"/>
+          </a:fontRef>
+        </p:style>
+      </p:cxnSp>
+      <p:pic>
+        <p:nvPicPr>
+          <p:cNvPr id="4" name="Picture 3">
+            <a:extLst>
+              <a:ext uri="{FF2B5EF4-FFF2-40B4-BE49-F238E27FC236}">
+                <a16:creationId xmlns:a16="http://schemas.microsoft.com/office/drawing/2014/main" id="{6F04DC2E-B5EF-47CB-BDDA-DDD5D2FD1213}"/>
+              </a:ext>
+            </a:extLst>
+          </p:cNvPr>
+          <p:cNvPicPr>
+            <a:picLocks noChangeAspect="1"/>
+          </p:cNvPicPr>
+          <p:nvPr/>
+        </p:nvPicPr>
+        <p:blipFill>
+          <a:blip r:embed="rId3"/>
+          <a:stretch>
+            <a:fillRect/>
+          </a:stretch>
+        </p:blipFill>
+        <p:spPr>
+          <a:xfrm>
+            <a:off x="1732807" y="3905349"/>
+            <a:ext cx="8887794" cy="1566696"/>
+          </a:xfrm>
+          <a:prstGeom prst="rect">
+            <a:avLst/>
+          </a:prstGeom>
+        </p:spPr>
+      </p:pic>
+      <p:cxnSp>
+        <p:nvCxnSpPr>
+          <p:cNvPr id="34" name="Straight Arrow Connector 33">
+            <a:extLst>
+              <a:ext uri="{FF2B5EF4-FFF2-40B4-BE49-F238E27FC236}">
+                <a16:creationId xmlns:a16="http://schemas.microsoft.com/office/drawing/2014/main" id="{4153D2F5-A3DB-44A2-B7C6-852D36DBC4B9}"/>
+              </a:ext>
+            </a:extLst>
+          </p:cNvPr>
+          <p:cNvCxnSpPr>
+            <a:cxnSpLocks/>
+          </p:cNvCxnSpPr>
+          <p:nvPr/>
+        </p:nvCxnSpPr>
+        <p:spPr>
+          <a:xfrm flipH="1">
+            <a:off x="6556711" y="1317351"/>
+            <a:ext cx="444224" cy="2866503"/>
           </a:xfrm>
           <a:prstGeom prst="straightConnector1">
             <a:avLst/>

</xml_diff>